<commit_message>
- Add last tutorial
</commit_message>
<xml_diff>
--- a/Helloworld Tornado.pptx
+++ b/Helloworld Tornado.pptx
@@ -5958,7 +5958,7 @@
             </a:pPr>
             <a:r>
               <a:rPr lang="en"/>
-              <a:t>Tornado Structure</a:t>
+              <a:t>Exercise</a:t>
             </a:r>
           </a:p>
         </p:txBody>
@@ -5973,8 +5973,8 @@
         </p:nvSpPr>
         <p:spPr>
           <a:xfrm>
-            <a:off x="893700" y="1373600"/>
-            <a:ext cx="7603200" cy="3552300"/>
+            <a:off x="893700" y="1373587"/>
+            <a:ext cx="6462600" cy="3552300"/>
           </a:xfrm>
           <a:prstGeom prst="rect">
             <a:avLst/>
@@ -5987,9 +5987,6 @@
           <a:lstStyle/>
           <a:p>
             <a:pPr indent="-298450" lvl="0" marL="457200" rtl="0">
-              <a:lnSpc>
-                <a:spcPct val="115000"/>
-              </a:lnSpc>
               <a:spcBef>
                 <a:spcPts val="0"/>
               </a:spcBef>
@@ -5997,7 +5994,7 @@
             </a:pPr>
             <a:r>
               <a:rPr lang="en" sz="1100"/>
-              <a:t>Application object</a:t>
+              <a:t>GET /user/{{id}}</a:t>
             </a:r>
           </a:p>
           <a:p>
@@ -6010,11 +6007,11 @@
             </a:pPr>
             <a:r>
               <a:rPr lang="en" sz="1100"/>
-              <a:t>The application object is responsible for global configuration, including the routing table and maps request to handlers </a:t>
-            </a:r>
-          </a:p>
-          <a:p>
-            <a:pPr indent="0" lvl="0" marL="0">
+              <a:t>Result: Return only username’s data</a:t>
+            </a:r>
+          </a:p>
+          <a:p>
+            <a:pPr indent="0" lvl="0" marL="457200" rtl="0">
               <a:spcBef>
                 <a:spcPts val="0"/>
               </a:spcBef>
@@ -6024,6 +6021,147 @@
               <a:t/>
             </a:r>
             <a:endParaRPr sz="1100"/>
+          </a:p>
+          <a:p>
+            <a:pPr indent="-298450" lvl="0" marL="457200" rtl="0">
+              <a:spcBef>
+                <a:spcPts val="0"/>
+              </a:spcBef>
+              <a:buSzPct val="100000"/>
+            </a:pPr>
+            <a:r>
+              <a:rPr lang="en" sz="1100"/>
+              <a:t>POST /user</a:t>
+            </a:r>
+          </a:p>
+          <a:p>
+            <a:pPr indent="-298450" lvl="1" marL="914400" rtl="0">
+              <a:spcBef>
+                <a:spcPts val="0"/>
+              </a:spcBef>
+              <a:buSzPct val="100000"/>
+              <a:buChar char="-"/>
+            </a:pPr>
+            <a:r>
+              <a:rPr lang="en" sz="1100"/>
+              <a:t>Request body example : </a:t>
+            </a:r>
+            <a:r>
+              <a:rPr lang="en" sz="1100" u="sng">
+                <a:solidFill>
+                  <a:schemeClr val="hlink"/>
+                </a:solidFill>
+                <a:hlinkClick r:id="rId3"/>
+              </a:rPr>
+              <a:t>http://www.jsoneditoronline.org/?id=cf2335aeb453d69fd78c6334a29e6dd1</a:t>
+            </a:r>
+          </a:p>
+          <a:p>
+            <a:pPr lvl="0" rtl="0">
+              <a:spcBef>
+                <a:spcPts val="0"/>
+              </a:spcBef>
+              <a:buNone/>
+            </a:pPr>
+            <a:r>
+              <a:t/>
+            </a:r>
+            <a:endParaRPr sz="1100"/>
+          </a:p>
+          <a:p>
+            <a:pPr indent="-298450" lvl="0" marL="457200" rtl="0">
+              <a:spcBef>
+                <a:spcPts val="0"/>
+              </a:spcBef>
+              <a:buSzPct val="100000"/>
+            </a:pPr>
+            <a:r>
+              <a:rPr lang="en" sz="1100"/>
+              <a:t>PUT /user</a:t>
+            </a:r>
+          </a:p>
+          <a:p>
+            <a:pPr indent="-298450" lvl="1" marL="914400" rtl="0">
+              <a:spcBef>
+                <a:spcPts val="0"/>
+              </a:spcBef>
+              <a:buSzPct val="100000"/>
+              <a:buChar char="-"/>
+            </a:pPr>
+            <a:r>
+              <a:rPr lang="en" sz="1100"/>
+              <a:t>Request body example : </a:t>
+            </a:r>
+            <a:r>
+              <a:rPr lang="en" sz="1100" u="sng">
+                <a:solidFill>
+                  <a:schemeClr val="hlink"/>
+                </a:solidFill>
+                <a:hlinkClick r:id="rId4"/>
+              </a:rPr>
+              <a:t>http://www.jsoneditoronline.org/?id=cf2335aeb453d69fd78c6334a29e6dd1</a:t>
+            </a:r>
+          </a:p>
+          <a:p>
+            <a:pPr lvl="0" rtl="0">
+              <a:spcBef>
+                <a:spcPts val="0"/>
+              </a:spcBef>
+              <a:buNone/>
+            </a:pPr>
+            <a:r>
+              <a:t/>
+            </a:r>
+            <a:endParaRPr sz="1100"/>
+          </a:p>
+          <a:p>
+            <a:pPr indent="-298450" lvl="0" marL="457200" rtl="0">
+              <a:spcBef>
+                <a:spcPts val="0"/>
+              </a:spcBef>
+              <a:buSzPct val="100000"/>
+            </a:pPr>
+            <a:r>
+              <a:rPr lang="en" sz="1100"/>
+              <a:t>DELETE /user/{{id}}</a:t>
+            </a:r>
+          </a:p>
+          <a:p>
+            <a:pPr indent="-298450" lvl="0" marL="457200" rtl="0">
+              <a:spcBef>
+                <a:spcPts val="0"/>
+              </a:spcBef>
+              <a:buSzPct val="100000"/>
+            </a:pPr>
+            <a:r>
+              <a:rPr lang="en" sz="1100"/>
+              <a:t>DELETE /user</a:t>
+            </a:r>
+          </a:p>
+          <a:p>
+            <a:pPr indent="-298450" lvl="1" marL="914400" rtl="0">
+              <a:spcBef>
+                <a:spcPts val="0"/>
+              </a:spcBef>
+              <a:buSzPct val="100000"/>
+              <a:buChar char="-"/>
+            </a:pPr>
+            <a:r>
+              <a:rPr lang="en" sz="1100"/>
+              <a:t>Request body example: { "UserId":[5,3,2] }</a:t>
+            </a:r>
+          </a:p>
+          <a:p>
+            <a:pPr indent="0" lvl="0" marL="457200" rtl="0">
+              <a:spcBef>
+                <a:spcPts val="0"/>
+              </a:spcBef>
+              <a:buNone/>
+            </a:pPr>
+            <a:r>
+              <a:rPr lang="en" sz="1100"/>
+              <a:t>	</a:t>
+            </a:r>
           </a:p>
         </p:txBody>
       </p:sp>
@@ -7108,13 +7246,13 @@
           <p:cNvPr id="124" name="Shape 124"/>
           <p:cNvSpPr txBox="1"/>
           <p:nvPr>
-            <p:ph type="ctrTitle"/>
+            <p:ph type="title"/>
           </p:nvPr>
         </p:nvSpPr>
         <p:spPr>
           <a:xfrm>
-            <a:off x="311708" y="744575"/>
-            <a:ext cx="8520600" cy="2052600"/>
+            <a:off x="893700" y="205987"/>
+            <a:ext cx="6462600" cy="857400"/>
           </a:xfrm>
           <a:prstGeom prst="rect">
             <a:avLst/>
@@ -7134,7 +7272,7 @@
             </a:pPr>
             <a:r>
               <a:rPr lang="en"/>
-              <a:t>API</a:t>
+              <a:t>HTTP Headers</a:t>
             </a:r>
           </a:p>
         </p:txBody>
@@ -7144,13 +7282,13 @@
           <p:cNvPr id="125" name="Shape 125"/>
           <p:cNvSpPr txBox="1"/>
           <p:nvPr>
-            <p:ph idx="1" type="subTitle"/>
+            <p:ph idx="1" type="body"/>
           </p:nvPr>
         </p:nvSpPr>
         <p:spPr>
           <a:xfrm>
-            <a:off x="311700" y="2834125"/>
-            <a:ext cx="8520600" cy="792600"/>
+            <a:off x="893700" y="1373587"/>
+            <a:ext cx="6462600" cy="3552300"/>
           </a:xfrm>
           <a:prstGeom prst="rect">
             <a:avLst/>
@@ -7162,6 +7300,22 @@
           </a:bodyPr>
           <a:lstStyle/>
           <a:p>
+            <a:pPr indent="457200" lvl="0">
+              <a:spcBef>
+                <a:spcPts val="0"/>
+              </a:spcBef>
+              <a:buNone/>
+            </a:pPr>
+            <a:r>
+              <a:rPr lang="en" sz="1100">
+                <a:solidFill>
+                  <a:schemeClr val="dk2"/>
+                </a:solidFill>
+              </a:rPr>
+              <a:t>The Cross-Origin Resource Sharing standard works by adding new HTTP headers that allow servers to describe the set of origins that are permitted to read that information using a web browser. Additionally, for HTTP request methods that can cause side-effects on user data (in particular, for HTTP methods other than GET, or for POST usage with certain MIME types), the specification mandates that browsers "preflight" the request, soliciting supported methods from the server with an HTTP OPTIONS request method, and then, upon "approval" from the server, sending the actual request with the actual HTTP request method. Servers can also notify clients whether "credentials" (including Cookies and HTTP Authentication data) should be sent with requests.</a:t>
+            </a:r>
+          </a:p>
+          <a:p>
             <a:pPr lvl="0">
               <a:spcBef>
                 <a:spcPts val="0"/>
@@ -7171,7 +7325,35 @@
             <a:r>
               <a:t/>
             </a:r>
-            <a:endParaRPr/>
+            <a:endParaRPr sz="1100">
+              <a:solidFill>
+                <a:schemeClr val="dk2"/>
+              </a:solidFill>
+            </a:endParaRPr>
+          </a:p>
+          <a:p>
+            <a:pPr lvl="0">
+              <a:spcBef>
+                <a:spcPts val="0"/>
+              </a:spcBef>
+              <a:buNone/>
+            </a:pPr>
+            <a:r>
+              <a:rPr lang="en" sz="1200"/>
+              <a:t>In tornado</a:t>
+            </a:r>
+          </a:p>
+          <a:p>
+            <a:pPr indent="-304800" lvl="0" marL="457200">
+              <a:spcBef>
+                <a:spcPts val="0"/>
+              </a:spcBef>
+              <a:buSzPct val="100000"/>
+            </a:pPr>
+            <a:r>
+              <a:rPr lang="en" sz="1200"/>
+              <a:t>tornado.web.RequestHandler.add_header()</a:t>
+            </a:r>
           </a:p>
         </p:txBody>
       </p:sp>
@@ -7210,8 +7392,8 @@
         </p:nvSpPr>
         <p:spPr>
           <a:xfrm>
-            <a:off x="893700" y="206000"/>
-            <a:ext cx="7436400" cy="857400"/>
+            <a:off x="893700" y="205987"/>
+            <a:ext cx="6462600" cy="857400"/>
           </a:xfrm>
           <a:prstGeom prst="rect">
             <a:avLst/>
@@ -7230,8 +7412,8 @@
               <a:buNone/>
             </a:pPr>
             <a:r>
-              <a:rPr lang="en" sz="3000"/>
-              <a:t>API (Application Programming Interface)</a:t>
+              <a:rPr lang="en"/>
+              <a:t>SQLite</a:t>
             </a:r>
           </a:p>
         </p:txBody>
@@ -7259,16 +7441,188 @@
           </a:bodyPr>
           <a:lstStyle/>
           <a:p>
-            <a:pPr lvl="0">
-              <a:spcBef>
-                <a:spcPts val="0"/>
-              </a:spcBef>
-              <a:buNone/>
-            </a:pPr>
-            <a:r>
-              <a:t/>
-            </a:r>
-            <a:endParaRPr/>
+            <a:pPr indent="-317500" lvl="0" marL="457200" rtl="0">
+              <a:lnSpc>
+                <a:spcPct val="150000"/>
+              </a:lnSpc>
+              <a:spcBef>
+                <a:spcPts val="0"/>
+              </a:spcBef>
+              <a:buSzPct val="100000"/>
+            </a:pPr>
+            <a:r>
+              <a:rPr lang="en" sz="1400"/>
+              <a:t>Downloads</a:t>
+            </a:r>
+          </a:p>
+          <a:p>
+            <a:pPr indent="-317500" lvl="1" marL="914400" rtl="0">
+              <a:lnSpc>
+                <a:spcPct val="150000"/>
+              </a:lnSpc>
+              <a:spcBef>
+                <a:spcPts val="0"/>
+              </a:spcBef>
+              <a:buSzPct val="100000"/>
+              <a:buChar char="-"/>
+            </a:pPr>
+            <a:r>
+              <a:rPr lang="en" sz="1400"/>
+              <a:t>SQLite3 : </a:t>
+            </a:r>
+            <a:r>
+              <a:rPr lang="en" sz="1400" u="sng">
+                <a:solidFill>
+                  <a:schemeClr val="hlink"/>
+                </a:solidFill>
+                <a:hlinkClick r:id="rId3"/>
+              </a:rPr>
+              <a:t>https://sqlite.org/download.html</a:t>
+            </a:r>
+          </a:p>
+          <a:p>
+            <a:pPr indent="-317500" lvl="1" marL="914400" rtl="0">
+              <a:lnSpc>
+                <a:spcPct val="150000"/>
+              </a:lnSpc>
+              <a:spcBef>
+                <a:spcPts val="0"/>
+              </a:spcBef>
+              <a:buSzPct val="100000"/>
+              <a:buChar char="-"/>
+            </a:pPr>
+            <a:r>
+              <a:rPr lang="en" sz="1400"/>
+              <a:t>SQLite Browser : </a:t>
+            </a:r>
+            <a:r>
+              <a:rPr lang="en" sz="1400" u="sng">
+                <a:solidFill>
+                  <a:schemeClr val="hlink"/>
+                </a:solidFill>
+                <a:hlinkClick r:id="rId4"/>
+              </a:rPr>
+              <a:t>http://sqlitebrowser.org/</a:t>
+            </a:r>
+          </a:p>
+          <a:p>
+            <a:pPr indent="-317500" lvl="0" marL="457200" rtl="0">
+              <a:lnSpc>
+                <a:spcPct val="150000"/>
+              </a:lnSpc>
+              <a:spcBef>
+                <a:spcPts val="0"/>
+              </a:spcBef>
+              <a:buSzPct val="100000"/>
+            </a:pPr>
+            <a:r>
+              <a:rPr lang="en" sz="1400"/>
+              <a:t>In python</a:t>
+            </a:r>
+          </a:p>
+          <a:p>
+            <a:pPr indent="-317500" lvl="1" marL="914400" rtl="0">
+              <a:lnSpc>
+                <a:spcPct val="150000"/>
+              </a:lnSpc>
+              <a:spcBef>
+                <a:spcPts val="0"/>
+              </a:spcBef>
+              <a:buSzPct val="100000"/>
+              <a:buChar char="-"/>
+            </a:pPr>
+            <a:r>
+              <a:rPr lang="en" sz="1400"/>
+              <a:t>i</a:t>
+            </a:r>
+            <a:r>
+              <a:rPr lang="en" sz="1400"/>
+              <a:t>mport sqlite3 as sqlite</a:t>
+            </a:r>
+          </a:p>
+          <a:p>
+            <a:pPr indent="-317500" lvl="1" marL="914400" rtl="0">
+              <a:lnSpc>
+                <a:spcPct val="150000"/>
+              </a:lnSpc>
+              <a:spcBef>
+                <a:spcPts val="0"/>
+              </a:spcBef>
+              <a:buSzPct val="100000"/>
+              <a:buChar char="-"/>
+            </a:pPr>
+            <a:r>
+              <a:rPr lang="en" sz="1400"/>
+              <a:t>c</a:t>
+            </a:r>
+            <a:r>
+              <a:rPr lang="en" sz="1400"/>
+              <a:t>onnection = sqlite.connect(“DB file path”)</a:t>
+            </a:r>
+          </a:p>
+          <a:p>
+            <a:pPr indent="-317500" lvl="1" marL="914400" rtl="0">
+              <a:lnSpc>
+                <a:spcPct val="150000"/>
+              </a:lnSpc>
+              <a:spcBef>
+                <a:spcPts val="0"/>
+              </a:spcBef>
+              <a:buSzPct val="100000"/>
+              <a:buChar char="-"/>
+            </a:pPr>
+            <a:r>
+              <a:rPr lang="en" sz="1400"/>
+              <a:t>cursor = connection.cursor()</a:t>
+            </a:r>
+          </a:p>
+          <a:p>
+            <a:pPr indent="-317500" lvl="1" marL="914400" rtl="0">
+              <a:lnSpc>
+                <a:spcPct val="150000"/>
+              </a:lnSpc>
+              <a:spcBef>
+                <a:spcPts val="0"/>
+              </a:spcBef>
+              <a:buSzPct val="100000"/>
+              <a:buChar char="-"/>
+            </a:pPr>
+            <a:r>
+              <a:rPr lang="en" sz="1400"/>
+              <a:t>cursor.execute(“Query String”)</a:t>
+            </a:r>
+          </a:p>
+          <a:p>
+            <a:pPr indent="-317500" lvl="1" marL="914400" rtl="0">
+              <a:lnSpc>
+                <a:spcPct val="150000"/>
+              </a:lnSpc>
+              <a:spcBef>
+                <a:spcPts val="0"/>
+              </a:spcBef>
+              <a:buSzPct val="100000"/>
+              <a:buChar char="-"/>
+            </a:pPr>
+            <a:r>
+              <a:rPr lang="en" sz="1400"/>
+              <a:t>cursor.commit()</a:t>
+            </a:r>
+          </a:p>
+          <a:p>
+            <a:pPr indent="-317500" lvl="1" marL="914400">
+              <a:lnSpc>
+                <a:spcPct val="150000"/>
+              </a:lnSpc>
+              <a:spcBef>
+                <a:spcPts val="0"/>
+              </a:spcBef>
+              <a:buSzPct val="100000"/>
+              <a:buChar char="-"/>
+            </a:pPr>
+            <a:r>
+              <a:rPr lang="en" sz="1400"/>
+              <a:t>connection.close()</a:t>
+            </a:r>
           </a:p>
         </p:txBody>
       </p:sp>

</xml_diff>